<commit_message>
some updates to pressure sensors
</commit_message>
<xml_diff>
--- a/Lab Equipment and Etc/Pressure Transducer Pinouts and Calibrations.pptx
+++ b/Lab Equipment and Etc/Pressure Transducer Pinouts and Calibrations.pptx
@@ -7,9 +7,10 @@
   <p:sldIdLst>
     <p:sldId id="256" r:id="rId2"/>
     <p:sldId id="257" r:id="rId3"/>
-    <p:sldId id="258" r:id="rId4"/>
-    <p:sldId id="259" r:id="rId5"/>
-    <p:sldId id="260" r:id="rId6"/>
+    <p:sldId id="261" r:id="rId4"/>
+    <p:sldId id="258" r:id="rId5"/>
+    <p:sldId id="259" r:id="rId6"/>
+    <p:sldId id="260" r:id="rId7"/>
   </p:sldIdLst>
   <p:sldSz cx="12192000" cy="6858000"/>
   <p:notesSz cx="6858000" cy="9144000"/>
@@ -247,7 +248,7 @@
           <a:p>
             <a:fld id="{E4F73F60-338B-4445-B453-A9D7AA4B1FAF}" type="datetimeFigureOut">
               <a:rPr lang="en-US" smtClean="0"/>
-              <a:t>1/31/2017</a:t>
+              <a:t>2/14/2017</a:t>
             </a:fld>
             <a:endParaRPr lang="en-US"/>
           </a:p>
@@ -417,7 +418,7 @@
           <a:p>
             <a:fld id="{E4F73F60-338B-4445-B453-A9D7AA4B1FAF}" type="datetimeFigureOut">
               <a:rPr lang="en-US" smtClean="0"/>
-              <a:t>1/31/2017</a:t>
+              <a:t>2/14/2017</a:t>
             </a:fld>
             <a:endParaRPr lang="en-US"/>
           </a:p>
@@ -597,7 +598,7 @@
           <a:p>
             <a:fld id="{E4F73F60-338B-4445-B453-A9D7AA4B1FAF}" type="datetimeFigureOut">
               <a:rPr lang="en-US" smtClean="0"/>
-              <a:t>1/31/2017</a:t>
+              <a:t>2/14/2017</a:t>
             </a:fld>
             <a:endParaRPr lang="en-US"/>
           </a:p>
@@ -767,7 +768,7 @@
           <a:p>
             <a:fld id="{E4F73F60-338B-4445-B453-A9D7AA4B1FAF}" type="datetimeFigureOut">
               <a:rPr lang="en-US" smtClean="0"/>
-              <a:t>1/31/2017</a:t>
+              <a:t>2/14/2017</a:t>
             </a:fld>
             <a:endParaRPr lang="en-US"/>
           </a:p>
@@ -1013,7 +1014,7 @@
           <a:p>
             <a:fld id="{E4F73F60-338B-4445-B453-A9D7AA4B1FAF}" type="datetimeFigureOut">
               <a:rPr lang="en-US" smtClean="0"/>
-              <a:t>1/31/2017</a:t>
+              <a:t>2/14/2017</a:t>
             </a:fld>
             <a:endParaRPr lang="en-US"/>
           </a:p>
@@ -1245,7 +1246,7 @@
           <a:p>
             <a:fld id="{E4F73F60-338B-4445-B453-A9D7AA4B1FAF}" type="datetimeFigureOut">
               <a:rPr lang="en-US" smtClean="0"/>
-              <a:t>1/31/2017</a:t>
+              <a:t>2/14/2017</a:t>
             </a:fld>
             <a:endParaRPr lang="en-US"/>
           </a:p>
@@ -1612,7 +1613,7 @@
           <a:p>
             <a:fld id="{E4F73F60-338B-4445-B453-A9D7AA4B1FAF}" type="datetimeFigureOut">
               <a:rPr lang="en-US" smtClean="0"/>
-              <a:t>1/31/2017</a:t>
+              <a:t>2/14/2017</a:t>
             </a:fld>
             <a:endParaRPr lang="en-US"/>
           </a:p>
@@ -1730,7 +1731,7 @@
           <a:p>
             <a:fld id="{E4F73F60-338B-4445-B453-A9D7AA4B1FAF}" type="datetimeFigureOut">
               <a:rPr lang="en-US" smtClean="0"/>
-              <a:t>1/31/2017</a:t>
+              <a:t>2/14/2017</a:t>
             </a:fld>
             <a:endParaRPr lang="en-US"/>
           </a:p>
@@ -1825,7 +1826,7 @@
           <a:p>
             <a:fld id="{E4F73F60-338B-4445-B453-A9D7AA4B1FAF}" type="datetimeFigureOut">
               <a:rPr lang="en-US" smtClean="0"/>
-              <a:t>1/31/2017</a:t>
+              <a:t>2/14/2017</a:t>
             </a:fld>
             <a:endParaRPr lang="en-US"/>
           </a:p>
@@ -2102,7 +2103,7 @@
           <a:p>
             <a:fld id="{E4F73F60-338B-4445-B453-A9D7AA4B1FAF}" type="datetimeFigureOut">
               <a:rPr lang="en-US" smtClean="0"/>
-              <a:t>1/31/2017</a:t>
+              <a:t>2/14/2017</a:t>
             </a:fld>
             <a:endParaRPr lang="en-US"/>
           </a:p>
@@ -2355,7 +2356,7 @@
           <a:p>
             <a:fld id="{E4F73F60-338B-4445-B453-A9D7AA4B1FAF}" type="datetimeFigureOut">
               <a:rPr lang="en-US" smtClean="0"/>
-              <a:t>1/31/2017</a:t>
+              <a:t>2/14/2017</a:t>
             </a:fld>
             <a:endParaRPr lang="en-US"/>
           </a:p>
@@ -2568,7 +2569,7 @@
           <a:p>
             <a:fld id="{E4F73F60-338B-4445-B453-A9D7AA4B1FAF}" type="datetimeFigureOut">
               <a:rPr lang="en-US" smtClean="0"/>
-              <a:t>1/31/2017</a:t>
+              <a:t>2/14/2017</a:t>
             </a:fld>
             <a:endParaRPr lang="en-US"/>
           </a:p>
@@ -3890,6 +3891,119 @@
           </a:p>
         </p:txBody>
       </p:sp>
+      <mc:AlternateContent xmlns:mc="http://schemas.openxmlformats.org/markup-compatibility/2006">
+        <mc:Choice xmlns:a14="http://schemas.microsoft.com/office/drawing/2010/main" Requires="a14">
+          <p:sp>
+            <p:nvSpPr>
+              <p:cNvPr id="2" name="TextBox 1"/>
+              <p:cNvSpPr txBox="1"/>
+              <p:nvPr/>
+            </p:nvSpPr>
+            <p:spPr>
+              <a:xfrm>
+                <a:off x="3040856" y="3503910"/>
+                <a:ext cx="2175029" cy="646331"/>
+              </a:xfrm>
+              <a:prstGeom prst="rect">
+                <a:avLst/>
+              </a:prstGeom>
+              <a:noFill/>
+            </p:spPr>
+            <p:txBody>
+              <a:bodyPr wrap="square" rtlCol="0">
+                <a:spAutoFit/>
+              </a:bodyPr>
+              <a:lstStyle/>
+              <a:p>
+                <a:pPr algn="ctr"/>
+                <a:r>
+                  <a:rPr lang="en-US" dirty="0" smtClean="0">
+                    <a:solidFill>
+                      <a:srgbClr val="C00000"/>
+                    </a:solidFill>
+                  </a:rPr>
+                  <a:t>Error Band is </a:t>
+                </a:r>
+                <a14:m>
+                  <m:oMath xmlns:m="http://schemas.openxmlformats.org/officeDocument/2006/math">
+                    <m:r>
+                      <a:rPr lang="en-US" i="1" smtClean="0">
+                        <a:solidFill>
+                          <a:srgbClr val="C00000"/>
+                        </a:solidFill>
+                        <a:latin typeface="Cambria Math" panose="02040503050406030204" pitchFamily="18" charset="0"/>
+                        <a:ea typeface="Cambria Math" panose="02040503050406030204" pitchFamily="18" charset="0"/>
+                      </a:rPr>
+                      <m:t>±</m:t>
+                    </m:r>
+                    <m:r>
+                      <a:rPr lang="en-US" b="0" i="1" smtClean="0">
+                        <a:solidFill>
+                          <a:srgbClr val="C00000"/>
+                        </a:solidFill>
+                        <a:latin typeface="Cambria Math" panose="02040503050406030204" pitchFamily="18" charset="0"/>
+                        <a:ea typeface="Cambria Math" panose="02040503050406030204" pitchFamily="18" charset="0"/>
+                      </a:rPr>
+                      <m:t>1%</m:t>
+                    </m:r>
+                  </m:oMath>
+                </a14:m>
+                <a:r>
+                  <a:rPr lang="en-US" dirty="0" smtClean="0">
+                    <a:solidFill>
+                      <a:srgbClr val="C00000"/>
+                    </a:solidFill>
+                  </a:rPr>
+                  <a:t> of Sensor Range</a:t>
+                </a:r>
+                <a:endParaRPr lang="en-US" dirty="0">
+                  <a:solidFill>
+                    <a:srgbClr val="C00000"/>
+                  </a:solidFill>
+                </a:endParaRPr>
+              </a:p>
+            </p:txBody>
+          </p:sp>
+        </mc:Choice>
+        <mc:Fallback>
+          <p:sp>
+            <p:nvSpPr>
+              <p:cNvPr id="2" name="TextBox 1"/>
+              <p:cNvSpPr txBox="1">
+                <a:spLocks noRot="1" noChangeAspect="1" noMove="1" noResize="1" noEditPoints="1" noAdjustHandles="1" noChangeArrowheads="1" noChangeShapeType="1" noTextEdit="1"/>
+              </p:cNvSpPr>
+              <p:nvPr/>
+            </p:nvSpPr>
+            <p:spPr>
+              <a:xfrm>
+                <a:off x="3040856" y="3503910"/>
+                <a:ext cx="2175029" cy="646331"/>
+              </a:xfrm>
+              <a:prstGeom prst="rect">
+                <a:avLst/>
+              </a:prstGeom>
+              <a:blipFill rotWithShape="0">
+                <a:blip r:embed="rId5"/>
+                <a:stretch>
+                  <a:fillRect l="-2521" t="-5660" r="-4202" b="-14151"/>
+                </a:stretch>
+              </a:blipFill>
+            </p:spPr>
+            <p:txBody>
+              <a:bodyPr/>
+              <a:lstStyle/>
+              <a:p>
+                <a:r>
+                  <a:rPr lang="en-US">
+                    <a:noFill/>
+                  </a:rPr>
+                  <a:t> </a:t>
+                </a:r>
+              </a:p>
+            </p:txBody>
+          </p:sp>
+        </mc:Fallback>
+      </mc:AlternateContent>
     </p:spTree>
     <p:extLst>
       <p:ext uri="{BB962C8B-B14F-4D97-AF65-F5344CB8AC3E}">
@@ -3959,8 +4073,8 @@
         </p:nvSpPr>
         <p:spPr>
           <a:xfrm>
-            <a:off x="2585776" y="500062"/>
-            <a:ext cx="7020448" cy="461665"/>
+            <a:off x="2532877" y="500062"/>
+            <a:ext cx="7126246" cy="461665"/>
           </a:xfrm>
           <a:prstGeom prst="rect">
             <a:avLst/>
@@ -3976,7 +4090,19 @@
             <a:pPr algn="ctr"/>
             <a:r>
               <a:rPr lang="en-US" sz="2400" dirty="0" smtClean="0"/>
-              <a:t>Honeywell SSCDRRNxxxKDAA3 Pinouts and Calibration</a:t>
+              <a:t>Honeywell </a:t>
+            </a:r>
+            <a:r>
+              <a:rPr lang="en-US" sz="2400" dirty="0" smtClean="0"/>
+              <a:t>HSCDRRN001NDAA3</a:t>
+            </a:r>
+            <a:r>
+              <a:rPr lang="en-US" sz="2400" dirty="0" smtClean="0"/>
+              <a:t> </a:t>
+            </a:r>
+            <a:r>
+              <a:rPr lang="en-US" sz="2400" dirty="0" smtClean="0"/>
+              <a:t>Pinouts and Calibration</a:t>
             </a:r>
             <a:endParaRPr lang="en-US" sz="2400" dirty="0"/>
           </a:p>
@@ -4670,7 +4796,7 @@
       </mc:AlternateContent>
       <p:sp>
         <p:nvSpPr>
-          <p:cNvPr id="8" name="Left Brace 7"/>
+          <p:cNvPr id="10" name="Left Brace 9"/>
           <p:cNvSpPr/>
           <p:nvPr/>
         </p:nvSpPr>
@@ -4716,6 +4842,1010 @@
       </p:sp>
       <p:sp>
         <p:nvSpPr>
+          <p:cNvPr id="11" name="TextBox 10"/>
+          <p:cNvSpPr txBox="1"/>
+          <p:nvPr/>
+        </p:nvSpPr>
+        <p:spPr>
+          <a:xfrm>
+            <a:off x="2557875" y="941121"/>
+            <a:ext cx="3192845" cy="923330"/>
+          </a:xfrm>
+          <a:prstGeom prst="rect">
+            <a:avLst/>
+          </a:prstGeom>
+          <a:noFill/>
+        </p:spPr>
+        <p:txBody>
+          <a:bodyPr wrap="square" rtlCol="0">
+            <a:spAutoFit/>
+          </a:bodyPr>
+          <a:lstStyle/>
+          <a:p>
+            <a:pPr algn="ctr"/>
+            <a:r>
+              <a:rPr lang="en-US" dirty="0" smtClean="0"/>
+              <a:t>Sensor Range is </a:t>
+            </a:r>
+            <a:endParaRPr lang="en-US" dirty="0" smtClean="0"/>
+          </a:p>
+          <a:p>
+            <a:pPr algn="ctr"/>
+            <a:r>
+              <a:rPr lang="en-US" dirty="0" smtClean="0"/>
+              <a:t>+/- 1 inches wate</a:t>
+            </a:r>
+            <a:r>
+              <a:rPr lang="en-US" dirty="0" smtClean="0"/>
+              <a:t>r column</a:t>
+            </a:r>
+            <a:endParaRPr lang="en-US" dirty="0" smtClean="0"/>
+          </a:p>
+          <a:p>
+            <a:pPr algn="ctr"/>
+            <a:r>
+              <a:rPr lang="en-US" dirty="0"/>
+              <a:t>(</a:t>
+            </a:r>
+            <a:r>
+              <a:rPr lang="en-US" dirty="0" smtClean="0"/>
+              <a:t>+/- </a:t>
+            </a:r>
+            <a:r>
+              <a:rPr lang="en-US" dirty="0" smtClean="0"/>
+              <a:t>248.84 </a:t>
+            </a:r>
+            <a:r>
+              <a:rPr lang="en-US" dirty="0" err="1" smtClean="0"/>
+              <a:t>Pascals</a:t>
+            </a:r>
+            <a:r>
+              <a:rPr lang="en-US" dirty="0" smtClean="0"/>
+              <a:t>)</a:t>
+            </a:r>
+            <a:endParaRPr lang="en-US" dirty="0"/>
+          </a:p>
+        </p:txBody>
+      </p:sp>
+      <mc:AlternateContent xmlns:mc="http://schemas.openxmlformats.org/markup-compatibility/2006">
+        <mc:Choice xmlns:a14="http://schemas.microsoft.com/office/drawing/2010/main" Requires="a14">
+          <p:sp>
+            <p:nvSpPr>
+              <p:cNvPr id="2" name="TextBox 1"/>
+              <p:cNvSpPr txBox="1"/>
+              <p:nvPr/>
+            </p:nvSpPr>
+            <p:spPr>
+              <a:xfrm>
+                <a:off x="3040856" y="3503910"/>
+                <a:ext cx="2175029" cy="646331"/>
+              </a:xfrm>
+              <a:prstGeom prst="rect">
+                <a:avLst/>
+              </a:prstGeom>
+              <a:noFill/>
+            </p:spPr>
+            <p:txBody>
+              <a:bodyPr wrap="square" rtlCol="0">
+                <a:spAutoFit/>
+              </a:bodyPr>
+              <a:lstStyle/>
+              <a:p>
+                <a:pPr algn="ctr"/>
+                <a:r>
+                  <a:rPr lang="en-US" dirty="0" smtClean="0">
+                    <a:solidFill>
+                      <a:srgbClr val="C00000"/>
+                    </a:solidFill>
+                  </a:rPr>
+                  <a:t>Error Band is </a:t>
+                </a:r>
+                <a14:m>
+                  <m:oMath xmlns:m="http://schemas.openxmlformats.org/officeDocument/2006/math">
+                    <m:r>
+                      <a:rPr lang="en-US" i="1" smtClean="0">
+                        <a:solidFill>
+                          <a:srgbClr val="C00000"/>
+                        </a:solidFill>
+                        <a:latin typeface="Cambria Math" panose="02040503050406030204" pitchFamily="18" charset="0"/>
+                        <a:ea typeface="Cambria Math" panose="02040503050406030204" pitchFamily="18" charset="0"/>
+                      </a:rPr>
+                      <m:t>±</m:t>
+                    </m:r>
+                    <m:r>
+                      <a:rPr lang="en-US" b="0" i="1" smtClean="0">
+                        <a:solidFill>
+                          <a:srgbClr val="C00000"/>
+                        </a:solidFill>
+                        <a:latin typeface="Cambria Math" panose="02040503050406030204" pitchFamily="18" charset="0"/>
+                        <a:ea typeface="Cambria Math" panose="02040503050406030204" pitchFamily="18" charset="0"/>
+                      </a:rPr>
+                      <m:t>2%</m:t>
+                    </m:r>
+                  </m:oMath>
+                </a14:m>
+                <a:r>
+                  <a:rPr lang="en-US" dirty="0" smtClean="0">
+                    <a:solidFill>
+                      <a:srgbClr val="C00000"/>
+                    </a:solidFill>
+                  </a:rPr>
+                  <a:t> of Sensor Range</a:t>
+                </a:r>
+                <a:endParaRPr lang="en-US" dirty="0">
+                  <a:solidFill>
+                    <a:srgbClr val="C00000"/>
+                  </a:solidFill>
+                </a:endParaRPr>
+              </a:p>
+            </p:txBody>
+          </p:sp>
+        </mc:Choice>
+        <mc:Fallback>
+          <p:sp>
+            <p:nvSpPr>
+              <p:cNvPr id="2" name="TextBox 1"/>
+              <p:cNvSpPr txBox="1">
+                <a:spLocks noRot="1" noChangeAspect="1" noMove="1" noResize="1" noEditPoints="1" noAdjustHandles="1" noChangeArrowheads="1" noChangeShapeType="1" noTextEdit="1"/>
+              </p:cNvSpPr>
+              <p:nvPr/>
+            </p:nvSpPr>
+            <p:spPr>
+              <a:xfrm>
+                <a:off x="3040856" y="3503910"/>
+                <a:ext cx="2175029" cy="646331"/>
+              </a:xfrm>
+              <a:prstGeom prst="rect">
+                <a:avLst/>
+              </a:prstGeom>
+              <a:blipFill rotWithShape="0">
+                <a:blip r:embed="rId5"/>
+                <a:stretch>
+                  <a:fillRect l="-2521" t="-5660" r="-4202" b="-14151"/>
+                </a:stretch>
+              </a:blipFill>
+            </p:spPr>
+            <p:txBody>
+              <a:bodyPr/>
+              <a:lstStyle/>
+              <a:p>
+                <a:r>
+                  <a:rPr lang="en-US">
+                    <a:noFill/>
+                  </a:rPr>
+                  <a:t> </a:t>
+                </a:r>
+              </a:p>
+            </p:txBody>
+          </p:sp>
+        </mc:Fallback>
+      </mc:AlternateContent>
+    </p:spTree>
+    <p:extLst>
+      <p:ext uri="{BB962C8B-B14F-4D97-AF65-F5344CB8AC3E}">
+        <p14:creationId xmlns:p14="http://schemas.microsoft.com/office/powerpoint/2010/main" val="1980761809"/>
+      </p:ext>
+    </p:extLst>
+  </p:cSld>
+  <p:clrMapOvr>
+    <a:masterClrMapping/>
+  </p:clrMapOvr>
+  <p:timing>
+    <p:tnLst>
+      <p:par>
+        <p:cTn id="1" dur="indefinite" restart="never" nodeType="tmRoot"/>
+      </p:par>
+    </p:tnLst>
+  </p:timing>
+</p:sld>
+</file>
+
+<file path=ppt/slides/slide4.xml><?xml version="1.0" encoding="utf-8"?>
+<p:sld xmlns:a="http://schemas.openxmlformats.org/drawingml/2006/main" xmlns:r="http://schemas.openxmlformats.org/officeDocument/2006/relationships" xmlns:p="http://schemas.openxmlformats.org/presentationml/2006/main">
+  <p:cSld>
+    <p:spTree>
+      <p:nvGrpSpPr>
+        <p:cNvPr id="1" name=""/>
+        <p:cNvGrpSpPr/>
+        <p:nvPr/>
+      </p:nvGrpSpPr>
+      <p:grpSpPr>
+        <a:xfrm>
+          <a:off x="0" y="0"/>
+          <a:ext cx="0" cy="0"/>
+          <a:chOff x="0" y="0"/>
+          <a:chExt cx="0" cy="0"/>
+        </a:xfrm>
+      </p:grpSpPr>
+      <p:pic>
+        <p:nvPicPr>
+          <p:cNvPr id="4" name="Picture 3"/>
+          <p:cNvPicPr>
+            <a:picLocks noChangeAspect="1"/>
+          </p:cNvPicPr>
+          <p:nvPr/>
+        </p:nvPicPr>
+        <p:blipFill>
+          <a:blip r:embed="rId2"/>
+          <a:stretch>
+            <a:fillRect/>
+          </a:stretch>
+        </p:blipFill>
+        <p:spPr>
+          <a:xfrm>
+            <a:off x="5586414" y="675977"/>
+            <a:ext cx="3586161" cy="3835633"/>
+          </a:xfrm>
+          <a:prstGeom prst="rect">
+            <a:avLst/>
+          </a:prstGeom>
+        </p:spPr>
+      </p:pic>
+      <p:sp>
+        <p:nvSpPr>
+          <p:cNvPr id="5" name="TextBox 4"/>
+          <p:cNvSpPr txBox="1"/>
+          <p:nvPr/>
+        </p:nvSpPr>
+        <p:spPr>
+          <a:xfrm>
+            <a:off x="2585776" y="500062"/>
+            <a:ext cx="7020448" cy="461665"/>
+          </a:xfrm>
+          <a:prstGeom prst="rect">
+            <a:avLst/>
+          </a:prstGeom>
+          <a:noFill/>
+        </p:spPr>
+        <p:txBody>
+          <a:bodyPr wrap="none" rtlCol="0">
+            <a:spAutoFit/>
+          </a:bodyPr>
+          <a:lstStyle/>
+          <a:p>
+            <a:pPr algn="ctr"/>
+            <a:r>
+              <a:rPr lang="en-US" sz="2400" dirty="0" smtClean="0"/>
+              <a:t>Honeywell SSCDRRNxxxKDAA3 Pinouts and Calibration</a:t>
+            </a:r>
+            <a:endParaRPr lang="en-US" sz="2400" dirty="0"/>
+          </a:p>
+        </p:txBody>
+      </p:sp>
+      <mc:AlternateContent xmlns:mc="http://schemas.openxmlformats.org/markup-compatibility/2006" xmlns:a14="http://schemas.microsoft.com/office/drawing/2010/main">
+        <mc:Choice Requires="a14">
+          <p:sp>
+            <p:nvSpPr>
+              <p:cNvPr id="6" name="TextBox 5"/>
+              <p:cNvSpPr txBox="1"/>
+              <p:nvPr/>
+            </p:nvSpPr>
+            <p:spPr>
+              <a:xfrm>
+                <a:off x="3040856" y="1843844"/>
+                <a:ext cx="2709864" cy="1499898"/>
+              </a:xfrm>
+              <a:prstGeom prst="rect">
+                <a:avLst/>
+              </a:prstGeom>
+              <a:noFill/>
+            </p:spPr>
+            <p:txBody>
+              <a:bodyPr wrap="square" rtlCol="0">
+                <a:spAutoFit/>
+              </a:bodyPr>
+              <a:lstStyle/>
+              <a:p>
+                <a:r>
+                  <a:rPr lang="en-US" dirty="0" smtClean="0"/>
+                  <a:t>Pin 1: No Connection</a:t>
+                </a:r>
+              </a:p>
+              <a:p>
+                <a:r>
+                  <a:rPr lang="en-US" dirty="0" smtClean="0"/>
+                  <a:t>Pin 2: </a:t>
+                </a:r>
+                <a14:m>
+                  <m:oMath xmlns:m="http://schemas.openxmlformats.org/officeDocument/2006/math">
+                    <m:r>
+                      <a:rPr lang="en-US" i="1" dirty="0" smtClean="0">
+                        <a:latin typeface="Cambria Math" panose="02040503050406030204" pitchFamily="18" charset="0"/>
+                      </a:rPr>
+                      <m:t>𝑉</m:t>
+                    </m:r>
+                    <m:r>
+                      <a:rPr lang="en-US" i="1" baseline="30000" dirty="0" smtClean="0">
+                        <a:latin typeface="Cambria Math" panose="02040503050406030204" pitchFamily="18" charset="0"/>
+                      </a:rPr>
+                      <m:t>+</m:t>
+                    </m:r>
+                  </m:oMath>
+                </a14:m>
+                <a:r>
+                  <a:rPr lang="en-US" baseline="-25000" dirty="0"/>
+                  <a:t> </a:t>
+                </a:r>
+                <a:r>
+                  <a:rPr lang="en-US" dirty="0" smtClean="0"/>
+                  <a:t> (3 Volt Supply)</a:t>
+                </a:r>
+              </a:p>
+              <a:p>
+                <a:r>
+                  <a:rPr lang="en-US" dirty="0" smtClean="0"/>
+                  <a:t>Pin 3: </a:t>
+                </a:r>
+                <a14:m>
+                  <m:oMath xmlns:m="http://schemas.openxmlformats.org/officeDocument/2006/math">
+                    <m:sSub>
+                      <m:sSubPr>
+                        <m:ctrlPr>
+                          <a:rPr lang="en-US" b="0" i="1" smtClean="0">
+                            <a:latin typeface="Cambria Math" panose="02040503050406030204" pitchFamily="18" charset="0"/>
+                          </a:rPr>
+                        </m:ctrlPr>
+                      </m:sSubPr>
+                      <m:e>
+                        <m:r>
+                          <a:rPr lang="en-US" b="0" i="1" smtClean="0">
+                            <a:latin typeface="Cambria Math" panose="02040503050406030204" pitchFamily="18" charset="0"/>
+                          </a:rPr>
+                          <m:t>𝑉</m:t>
+                        </m:r>
+                      </m:e>
+                      <m:sub>
+                        <m:r>
+                          <a:rPr lang="en-US" b="0" i="1" smtClean="0">
+                            <a:latin typeface="Cambria Math" panose="02040503050406030204" pitchFamily="18" charset="0"/>
+                          </a:rPr>
+                          <m:t>𝑠𝑖𝑔𝑛𝑎𝑙</m:t>
+                        </m:r>
+                      </m:sub>
+                    </m:sSub>
+                  </m:oMath>
+                </a14:m>
+                <a:endParaRPr lang="en-US" dirty="0" smtClean="0"/>
+              </a:p>
+              <a:p>
+                <a:r>
+                  <a:rPr lang="en-US" dirty="0" smtClean="0"/>
+                  <a:t>Pin 4: Ground</a:t>
+                </a:r>
+              </a:p>
+              <a:p>
+                <a:r>
+                  <a:rPr lang="en-US" dirty="0" smtClean="0"/>
+                  <a:t>Pin 5-8: N/C</a:t>
+                </a:r>
+                <a:endParaRPr lang="en-US" dirty="0"/>
+              </a:p>
+            </p:txBody>
+          </p:sp>
+        </mc:Choice>
+        <mc:Fallback xmlns="">
+          <p:sp>
+            <p:nvSpPr>
+              <p:cNvPr id="6" name="TextBox 5"/>
+              <p:cNvSpPr txBox="1">
+                <a:spLocks noRot="1" noChangeAspect="1" noMove="1" noResize="1" noEditPoints="1" noAdjustHandles="1" noChangeArrowheads="1" noChangeShapeType="1" noTextEdit="1"/>
+              </p:cNvSpPr>
+              <p:nvPr/>
+            </p:nvSpPr>
+            <p:spPr>
+              <a:xfrm>
+                <a:off x="3040856" y="1843844"/>
+                <a:ext cx="2709864" cy="1499898"/>
+              </a:xfrm>
+              <a:prstGeom prst="rect">
+                <a:avLst/>
+              </a:prstGeom>
+              <a:blipFill rotWithShape="0">
+                <a:blip r:embed="rId3"/>
+                <a:stretch>
+                  <a:fillRect l="-2027" t="-2024" b="-5263"/>
+                </a:stretch>
+              </a:blipFill>
+            </p:spPr>
+            <p:txBody>
+              <a:bodyPr/>
+              <a:lstStyle/>
+              <a:p>
+                <a:r>
+                  <a:rPr lang="en-US">
+                    <a:noFill/>
+                  </a:rPr>
+                  <a:t> </a:t>
+                </a:r>
+              </a:p>
+            </p:txBody>
+          </p:sp>
+        </mc:Fallback>
+      </mc:AlternateContent>
+      <mc:AlternateContent xmlns:mc="http://schemas.openxmlformats.org/markup-compatibility/2006" xmlns:a14="http://schemas.microsoft.com/office/drawing/2010/main">
+        <mc:Choice Requires="a14">
+          <p:sp>
+            <p:nvSpPr>
+              <p:cNvPr id="7" name="TextBox 6"/>
+              <p:cNvSpPr txBox="1"/>
+              <p:nvPr/>
+            </p:nvSpPr>
+            <p:spPr>
+              <a:xfrm>
+                <a:off x="3205163" y="4318886"/>
+                <a:ext cx="5781675" cy="1822678"/>
+              </a:xfrm>
+              <a:prstGeom prst="rect">
+                <a:avLst/>
+              </a:prstGeom>
+              <a:noFill/>
+            </p:spPr>
+            <p:txBody>
+              <a:bodyPr wrap="square" rtlCol="0">
+                <a:spAutoFit/>
+              </a:bodyPr>
+              <a:lstStyle/>
+              <a:p>
+                <a:r>
+                  <a:rPr lang="en-US" dirty="0" smtClean="0"/>
+                  <a:t>Calibration Curve</a:t>
+                </a:r>
+              </a:p>
+              <a:p>
+                <a:pPr/>
+                <a14:m>
+                  <m:oMathPara xmlns:m="http://schemas.openxmlformats.org/officeDocument/2006/math">
+                    <m:oMathParaPr>
+                      <m:jc m:val="centerGroup"/>
+                    </m:oMathParaPr>
+                    <m:oMath xmlns:m="http://schemas.openxmlformats.org/officeDocument/2006/math">
+                      <m:sSub>
+                        <m:sSubPr>
+                          <m:ctrlPr>
+                            <a:rPr lang="en-US" b="0" i="1" smtClean="0">
+                              <a:latin typeface="Cambria Math" panose="02040503050406030204" pitchFamily="18" charset="0"/>
+                            </a:rPr>
+                          </m:ctrlPr>
+                        </m:sSubPr>
+                        <m:e>
+                          <m:r>
+                            <a:rPr lang="en-US" b="0" i="1" smtClean="0">
+                              <a:latin typeface="Cambria Math" panose="02040503050406030204" pitchFamily="18" charset="0"/>
+                            </a:rPr>
+                            <m:t>𝑃</m:t>
+                          </m:r>
+                        </m:e>
+                        <m:sub>
+                          <m:r>
+                            <a:rPr lang="en-US" b="0" i="1" smtClean="0">
+                              <a:latin typeface="Cambria Math" panose="02040503050406030204" pitchFamily="18" charset="0"/>
+                            </a:rPr>
+                            <m:t>𝑎𝑝𝑝</m:t>
+                          </m:r>
+                        </m:sub>
+                      </m:sSub>
+                      <m:r>
+                        <a:rPr lang="en-US" b="0" i="1" smtClean="0">
+                          <a:latin typeface="Cambria Math" panose="02040503050406030204" pitchFamily="18" charset="0"/>
+                        </a:rPr>
+                        <m:t>=</m:t>
+                      </m:r>
+                      <m:sSub>
+                        <m:sSubPr>
+                          <m:ctrlPr>
+                            <a:rPr lang="en-US" b="0" i="1" smtClean="0">
+                              <a:latin typeface="Cambria Math" panose="02040503050406030204" pitchFamily="18" charset="0"/>
+                            </a:rPr>
+                          </m:ctrlPr>
+                        </m:sSubPr>
+                        <m:e>
+                          <m:r>
+                            <a:rPr lang="en-US" b="0" i="1" smtClean="0">
+                              <a:latin typeface="Cambria Math" panose="02040503050406030204" pitchFamily="18" charset="0"/>
+                            </a:rPr>
+                            <m:t>𝑃</m:t>
+                          </m:r>
+                        </m:e>
+                        <m:sub>
+                          <m:r>
+                            <a:rPr lang="en-US" b="0" i="1" smtClean="0">
+                              <a:latin typeface="Cambria Math" panose="02040503050406030204" pitchFamily="18" charset="0"/>
+                            </a:rPr>
+                            <m:t>𝑚𝑖𝑛</m:t>
+                          </m:r>
+                        </m:sub>
+                      </m:sSub>
+                      <m:r>
+                        <a:rPr lang="en-US" b="0" i="1" smtClean="0">
+                          <a:latin typeface="Cambria Math" panose="02040503050406030204" pitchFamily="18" charset="0"/>
+                        </a:rPr>
+                        <m:t>+</m:t>
+                      </m:r>
+                      <m:f>
+                        <m:fPr>
+                          <m:ctrlPr>
+                            <a:rPr lang="en-US" b="0" i="1" smtClean="0">
+                              <a:latin typeface="Cambria Math" panose="02040503050406030204" pitchFamily="18" charset="0"/>
+                            </a:rPr>
+                          </m:ctrlPr>
+                        </m:fPr>
+                        <m:num>
+                          <m:sSub>
+                            <m:sSubPr>
+                              <m:ctrlPr>
+                                <a:rPr lang="en-US" b="0" i="1" smtClean="0">
+                                  <a:latin typeface="Cambria Math" panose="02040503050406030204" pitchFamily="18" charset="0"/>
+                                </a:rPr>
+                              </m:ctrlPr>
+                            </m:sSubPr>
+                            <m:e>
+                              <m:r>
+                                <a:rPr lang="en-US" b="0" i="1" smtClean="0">
+                                  <a:latin typeface="Cambria Math" panose="02040503050406030204" pitchFamily="18" charset="0"/>
+                                </a:rPr>
+                                <m:t>𝑃</m:t>
+                              </m:r>
+                            </m:e>
+                            <m:sub>
+                              <m:r>
+                                <a:rPr lang="en-US" b="0" i="1" smtClean="0">
+                                  <a:latin typeface="Cambria Math" panose="02040503050406030204" pitchFamily="18" charset="0"/>
+                                </a:rPr>
+                                <m:t>𝑚𝑎𝑥</m:t>
+                              </m:r>
+                            </m:sub>
+                          </m:sSub>
+                          <m:r>
+                            <a:rPr lang="en-US" b="0" i="1" smtClean="0">
+                              <a:latin typeface="Cambria Math" panose="02040503050406030204" pitchFamily="18" charset="0"/>
+                            </a:rPr>
+                            <m:t>−</m:t>
+                          </m:r>
+                          <m:sSub>
+                            <m:sSubPr>
+                              <m:ctrlPr>
+                                <a:rPr lang="en-US" b="0" i="1" smtClean="0">
+                                  <a:latin typeface="Cambria Math" panose="02040503050406030204" pitchFamily="18" charset="0"/>
+                                </a:rPr>
+                              </m:ctrlPr>
+                            </m:sSubPr>
+                            <m:e>
+                              <m:r>
+                                <a:rPr lang="en-US" b="0" i="1" smtClean="0">
+                                  <a:latin typeface="Cambria Math" panose="02040503050406030204" pitchFamily="18" charset="0"/>
+                                </a:rPr>
+                                <m:t>𝑃</m:t>
+                              </m:r>
+                            </m:e>
+                            <m:sub>
+                              <m:r>
+                                <a:rPr lang="en-US" b="0" i="1" smtClean="0">
+                                  <a:latin typeface="Cambria Math" panose="02040503050406030204" pitchFamily="18" charset="0"/>
+                                </a:rPr>
+                                <m:t>𝑚𝑖𝑛</m:t>
+                              </m:r>
+                            </m:sub>
+                          </m:sSub>
+                        </m:num>
+                        <m:den>
+                          <m:r>
+                            <a:rPr lang="en-US" b="0" i="1" smtClean="0">
+                              <a:latin typeface="Cambria Math" panose="02040503050406030204" pitchFamily="18" charset="0"/>
+                            </a:rPr>
+                            <m:t>0.8</m:t>
+                          </m:r>
+                        </m:den>
+                      </m:f>
+                      <m:d>
+                        <m:dPr>
+                          <m:ctrlPr>
+                            <a:rPr lang="en-US" b="0" i="1" smtClean="0">
+                              <a:latin typeface="Cambria Math" panose="02040503050406030204" pitchFamily="18" charset="0"/>
+                            </a:rPr>
+                          </m:ctrlPr>
+                        </m:dPr>
+                        <m:e>
+                          <m:f>
+                            <m:fPr>
+                              <m:ctrlPr>
+                                <a:rPr lang="en-US" b="0" i="1" smtClean="0">
+                                  <a:latin typeface="Cambria Math" panose="02040503050406030204" pitchFamily="18" charset="0"/>
+                                </a:rPr>
+                              </m:ctrlPr>
+                            </m:fPr>
+                            <m:num>
+                              <m:sSub>
+                                <m:sSubPr>
+                                  <m:ctrlPr>
+                                    <a:rPr lang="en-US" b="0" i="1" smtClean="0">
+                                      <a:latin typeface="Cambria Math" panose="02040503050406030204" pitchFamily="18" charset="0"/>
+                                    </a:rPr>
+                                  </m:ctrlPr>
+                                </m:sSubPr>
+                                <m:e>
+                                  <m:r>
+                                    <a:rPr lang="en-US" b="0" i="1" smtClean="0">
+                                      <a:latin typeface="Cambria Math" panose="02040503050406030204" pitchFamily="18" charset="0"/>
+                                    </a:rPr>
+                                    <m:t>𝑉</m:t>
+                                  </m:r>
+                                </m:e>
+                                <m:sub>
+                                  <m:r>
+                                    <a:rPr lang="en-US" b="0" i="1" smtClean="0">
+                                      <a:latin typeface="Cambria Math" panose="02040503050406030204" pitchFamily="18" charset="0"/>
+                                    </a:rPr>
+                                    <m:t>𝑠𝑖𝑔𝑛𝑎𝑙</m:t>
+                                  </m:r>
+                                </m:sub>
+                              </m:sSub>
+                            </m:num>
+                            <m:den>
+                              <m:sSup>
+                                <m:sSupPr>
+                                  <m:ctrlPr>
+                                    <a:rPr lang="en-US" b="0" i="1" smtClean="0">
+                                      <a:latin typeface="Cambria Math" panose="02040503050406030204" pitchFamily="18" charset="0"/>
+                                    </a:rPr>
+                                  </m:ctrlPr>
+                                </m:sSupPr>
+                                <m:e>
+                                  <m:r>
+                                    <a:rPr lang="en-US" b="0" i="1" smtClean="0">
+                                      <a:latin typeface="Cambria Math" panose="02040503050406030204" pitchFamily="18" charset="0"/>
+                                    </a:rPr>
+                                    <m:t>𝑉</m:t>
+                                  </m:r>
+                                </m:e>
+                                <m:sup>
+                                  <m:r>
+                                    <a:rPr lang="en-US" b="0" i="1" smtClean="0">
+                                      <a:latin typeface="Cambria Math" panose="02040503050406030204" pitchFamily="18" charset="0"/>
+                                    </a:rPr>
+                                    <m:t>+</m:t>
+                                  </m:r>
+                                </m:sup>
+                              </m:sSup>
+                            </m:den>
+                          </m:f>
+                          <m:r>
+                            <a:rPr lang="en-US" b="0" i="1" smtClean="0">
+                              <a:latin typeface="Cambria Math" panose="02040503050406030204" pitchFamily="18" charset="0"/>
+                            </a:rPr>
+                            <m:t>−0.1</m:t>
+                          </m:r>
+                        </m:e>
+                      </m:d>
+                    </m:oMath>
+                  </m:oMathPara>
+                </a14:m>
+                <a:endParaRPr lang="en-US" dirty="0" smtClean="0"/>
+              </a:p>
+              <a:p>
+                <a:endParaRPr lang="en-US" dirty="0" smtClean="0"/>
+              </a:p>
+              <a:p>
+                <a:pPr/>
+                <a14:m>
+                  <m:oMathPara xmlns:m="http://schemas.openxmlformats.org/officeDocument/2006/math">
+                    <m:oMathParaPr>
+                      <m:jc m:val="centerGroup"/>
+                    </m:oMathParaPr>
+                    <m:oMath xmlns:m="http://schemas.openxmlformats.org/officeDocument/2006/math">
+                      <m:sSub>
+                        <m:sSubPr>
+                          <m:ctrlPr>
+                            <a:rPr lang="en-US" i="1" smtClean="0">
+                              <a:latin typeface="Cambria Math" panose="02040503050406030204" pitchFamily="18" charset="0"/>
+                            </a:rPr>
+                          </m:ctrlPr>
+                        </m:sSubPr>
+                        <m:e>
+                          <m:r>
+                            <a:rPr lang="en-US" b="0" i="1" smtClean="0">
+                              <a:latin typeface="Cambria Math" panose="02040503050406030204" pitchFamily="18" charset="0"/>
+                            </a:rPr>
+                            <m:t>𝑃</m:t>
+                          </m:r>
+                        </m:e>
+                        <m:sub>
+                          <m:r>
+                            <a:rPr lang="en-US" b="0" i="1" smtClean="0">
+                              <a:latin typeface="Cambria Math" panose="02040503050406030204" pitchFamily="18" charset="0"/>
+                            </a:rPr>
+                            <m:t>𝑚𝑎𝑥</m:t>
+                          </m:r>
+                        </m:sub>
+                      </m:sSub>
+                      <m:r>
+                        <a:rPr lang="en-US" b="0" i="1" smtClean="0">
+                          <a:latin typeface="Cambria Math" panose="02040503050406030204" pitchFamily="18" charset="0"/>
+                        </a:rPr>
+                        <m:t>=</m:t>
+                      </m:r>
+                      <m:r>
+                        <a:rPr lang="en-US" b="0" i="1" smtClean="0">
+                          <a:latin typeface="Cambria Math" panose="02040503050406030204" pitchFamily="18" charset="0"/>
+                        </a:rPr>
+                        <m:t>𝑀𝑎𝑥𝑖𝑚𝑢𝑚</m:t>
+                      </m:r>
+                      <m:r>
+                        <a:rPr lang="en-US" b="0" i="1" smtClean="0">
+                          <a:latin typeface="Cambria Math" panose="02040503050406030204" pitchFamily="18" charset="0"/>
+                        </a:rPr>
+                        <m:t> </m:t>
+                      </m:r>
+                      <m:r>
+                        <a:rPr lang="en-US" b="0" i="1" smtClean="0">
+                          <a:latin typeface="Cambria Math" panose="02040503050406030204" pitchFamily="18" charset="0"/>
+                        </a:rPr>
+                        <m:t>𝑚𝑒𝑎𝑠𝑢𝑟𝑎𝑏𝑙𝑒</m:t>
+                      </m:r>
+                      <m:r>
+                        <a:rPr lang="en-US" b="0" i="1" smtClean="0">
+                          <a:latin typeface="Cambria Math" panose="02040503050406030204" pitchFamily="18" charset="0"/>
+                        </a:rPr>
+                        <m:t> </m:t>
+                      </m:r>
+                      <m:r>
+                        <a:rPr lang="en-US" b="0" i="1" smtClean="0">
+                          <a:latin typeface="Cambria Math" panose="02040503050406030204" pitchFamily="18" charset="0"/>
+                        </a:rPr>
+                        <m:t>𝑝𝑟𝑒𝑠𝑠𝑢𝑟𝑒</m:t>
+                      </m:r>
+                      <m:r>
+                        <a:rPr lang="en-US" b="0" i="1" smtClean="0">
+                          <a:latin typeface="Cambria Math" panose="02040503050406030204" pitchFamily="18" charset="0"/>
+                        </a:rPr>
+                        <m:t> (</m:t>
+                      </m:r>
+                      <m:r>
+                        <a:rPr lang="en-US" b="0" i="1" smtClean="0">
+                          <a:latin typeface="Cambria Math" panose="02040503050406030204" pitchFamily="18" charset="0"/>
+                        </a:rPr>
+                        <m:t>𝑒</m:t>
+                      </m:r>
+                      <m:r>
+                        <a:rPr lang="en-US" b="0" i="1" smtClean="0">
+                          <a:latin typeface="Cambria Math" panose="02040503050406030204" pitchFamily="18" charset="0"/>
+                        </a:rPr>
+                        <m:t>.</m:t>
+                      </m:r>
+                      <m:r>
+                        <a:rPr lang="en-US" b="0" i="1" smtClean="0">
+                          <a:latin typeface="Cambria Math" panose="02040503050406030204" pitchFamily="18" charset="0"/>
+                        </a:rPr>
+                        <m:t>𝑔</m:t>
+                      </m:r>
+                      <m:r>
+                        <a:rPr lang="en-US" b="0" i="1" smtClean="0">
+                          <a:latin typeface="Cambria Math" panose="02040503050406030204" pitchFamily="18" charset="0"/>
+                        </a:rPr>
+                        <m:t>. +1</m:t>
+                      </m:r>
+                      <m:r>
+                        <a:rPr lang="en-US" b="0" i="1" smtClean="0">
+                          <a:latin typeface="Cambria Math" panose="02040503050406030204" pitchFamily="18" charset="0"/>
+                        </a:rPr>
+                        <m:t>𝑃𝑆𝐼</m:t>
+                      </m:r>
+                      <m:r>
+                        <a:rPr lang="en-US" b="0" i="1" smtClean="0">
+                          <a:latin typeface="Cambria Math" panose="02040503050406030204" pitchFamily="18" charset="0"/>
+                        </a:rPr>
+                        <m:t>)</m:t>
+                      </m:r>
+                    </m:oMath>
+                  </m:oMathPara>
+                </a14:m>
+                <a:endParaRPr lang="en-US" b="0" dirty="0" smtClean="0"/>
+              </a:p>
+              <a:p>
+                <a:pPr/>
+                <a14:m>
+                  <m:oMathPara xmlns:m="http://schemas.openxmlformats.org/officeDocument/2006/math">
+                    <m:oMathParaPr>
+                      <m:jc m:val="centerGroup"/>
+                    </m:oMathParaPr>
+                    <m:oMath xmlns:m="http://schemas.openxmlformats.org/officeDocument/2006/math">
+                      <m:sSub>
+                        <m:sSubPr>
+                          <m:ctrlPr>
+                            <a:rPr lang="en-US" i="1" smtClean="0">
+                              <a:latin typeface="Cambria Math" panose="02040503050406030204" pitchFamily="18" charset="0"/>
+                            </a:rPr>
+                          </m:ctrlPr>
+                        </m:sSubPr>
+                        <m:e>
+                          <m:r>
+                            <a:rPr lang="en-US" b="0" i="1" smtClean="0">
+                              <a:latin typeface="Cambria Math" panose="02040503050406030204" pitchFamily="18" charset="0"/>
+                            </a:rPr>
+                            <m:t>𝑃</m:t>
+                          </m:r>
+                        </m:e>
+                        <m:sub>
+                          <m:r>
+                            <a:rPr lang="en-US" b="0" i="1" smtClean="0">
+                              <a:latin typeface="Cambria Math" panose="02040503050406030204" pitchFamily="18" charset="0"/>
+                            </a:rPr>
+                            <m:t>𝑚𝑖𝑛</m:t>
+                          </m:r>
+                        </m:sub>
+                      </m:sSub>
+                      <m:r>
+                        <a:rPr lang="en-US" b="0" i="1" smtClean="0">
+                          <a:latin typeface="Cambria Math" panose="02040503050406030204" pitchFamily="18" charset="0"/>
+                        </a:rPr>
+                        <m:t>=</m:t>
+                      </m:r>
+                      <m:r>
+                        <a:rPr lang="en-US" b="0" i="1" smtClean="0">
+                          <a:latin typeface="Cambria Math" panose="02040503050406030204" pitchFamily="18" charset="0"/>
+                        </a:rPr>
+                        <m:t>𝑀𝑖𝑛𝑖𝑚𝑢𝑚</m:t>
+                      </m:r>
+                      <m:r>
+                        <a:rPr lang="en-US" b="0" i="1" smtClean="0">
+                          <a:latin typeface="Cambria Math" panose="02040503050406030204" pitchFamily="18" charset="0"/>
+                        </a:rPr>
+                        <m:t> </m:t>
+                      </m:r>
+                      <m:r>
+                        <a:rPr lang="en-US" b="0" i="1" smtClean="0">
+                          <a:latin typeface="Cambria Math" panose="02040503050406030204" pitchFamily="18" charset="0"/>
+                        </a:rPr>
+                        <m:t>𝑚𝑒𝑎𝑠𝑢𝑟𝑎𝑏𝑙𝑒</m:t>
+                      </m:r>
+                      <m:r>
+                        <a:rPr lang="en-US" b="0" i="1" smtClean="0">
+                          <a:latin typeface="Cambria Math" panose="02040503050406030204" pitchFamily="18" charset="0"/>
+                        </a:rPr>
+                        <m:t> </m:t>
+                      </m:r>
+                      <m:r>
+                        <a:rPr lang="en-US" b="0" i="1" smtClean="0">
+                          <a:latin typeface="Cambria Math" panose="02040503050406030204" pitchFamily="18" charset="0"/>
+                        </a:rPr>
+                        <m:t>𝑝𝑟𝑒𝑠𝑠𝑢𝑟𝑒</m:t>
+                      </m:r>
+                      <m:r>
+                        <a:rPr lang="en-US" b="0" i="1" smtClean="0">
+                          <a:latin typeface="Cambria Math" panose="02040503050406030204" pitchFamily="18" charset="0"/>
+                        </a:rPr>
+                        <m:t> (</m:t>
+                      </m:r>
+                      <m:r>
+                        <a:rPr lang="en-US" b="0" i="1" smtClean="0">
+                          <a:latin typeface="Cambria Math" panose="02040503050406030204" pitchFamily="18" charset="0"/>
+                        </a:rPr>
+                        <m:t>𝑒</m:t>
+                      </m:r>
+                      <m:r>
+                        <a:rPr lang="en-US" b="0" i="1" smtClean="0">
+                          <a:latin typeface="Cambria Math" panose="02040503050406030204" pitchFamily="18" charset="0"/>
+                        </a:rPr>
+                        <m:t>.</m:t>
+                      </m:r>
+                      <m:r>
+                        <a:rPr lang="en-US" b="0" i="1" smtClean="0">
+                          <a:latin typeface="Cambria Math" panose="02040503050406030204" pitchFamily="18" charset="0"/>
+                        </a:rPr>
+                        <m:t>𝑔</m:t>
+                      </m:r>
+                      <m:r>
+                        <a:rPr lang="en-US" b="0" i="1" smtClean="0">
+                          <a:latin typeface="Cambria Math" panose="02040503050406030204" pitchFamily="18" charset="0"/>
+                        </a:rPr>
+                        <m:t>. −1</m:t>
+                      </m:r>
+                      <m:r>
+                        <a:rPr lang="en-US" b="0" i="1" smtClean="0">
+                          <a:latin typeface="Cambria Math" panose="02040503050406030204" pitchFamily="18" charset="0"/>
+                        </a:rPr>
+                        <m:t>𝑃𝑆𝐼</m:t>
+                      </m:r>
+                      <m:r>
+                        <a:rPr lang="en-US" b="0" i="1" smtClean="0">
+                          <a:latin typeface="Cambria Math" panose="02040503050406030204" pitchFamily="18" charset="0"/>
+                        </a:rPr>
+                        <m:t>)</m:t>
+                      </m:r>
+                    </m:oMath>
+                  </m:oMathPara>
+                </a14:m>
+                <a:endParaRPr lang="en-US" dirty="0"/>
+              </a:p>
+            </p:txBody>
+          </p:sp>
+        </mc:Choice>
+        <mc:Fallback xmlns="">
+          <p:sp>
+            <p:nvSpPr>
+              <p:cNvPr id="7" name="TextBox 6"/>
+              <p:cNvSpPr txBox="1">
+                <a:spLocks noRot="1" noChangeAspect="1" noMove="1" noResize="1" noEditPoints="1" noAdjustHandles="1" noChangeArrowheads="1" noChangeShapeType="1" noTextEdit="1"/>
+              </p:cNvSpPr>
+              <p:nvPr/>
+            </p:nvSpPr>
+            <p:spPr>
+              <a:xfrm>
+                <a:off x="3205163" y="4318886"/>
+                <a:ext cx="5781675" cy="1822678"/>
+              </a:xfrm>
+              <a:prstGeom prst="rect">
+                <a:avLst/>
+              </a:prstGeom>
+              <a:blipFill rotWithShape="0">
+                <a:blip r:embed="rId4"/>
+                <a:stretch>
+                  <a:fillRect l="-949" t="-1672" b="-2007"/>
+                </a:stretch>
+              </a:blipFill>
+            </p:spPr>
+            <p:txBody>
+              <a:bodyPr/>
+              <a:lstStyle/>
+              <a:p>
+                <a:r>
+                  <a:rPr lang="en-US">
+                    <a:noFill/>
+                  </a:rPr>
+                  <a:t> </a:t>
+                </a:r>
+              </a:p>
+            </p:txBody>
+          </p:sp>
+        </mc:Fallback>
+      </mc:AlternateContent>
+      <p:sp>
+        <p:nvSpPr>
+          <p:cNvPr id="8" name="Left Brace 7"/>
+          <p:cNvSpPr/>
+          <p:nvPr/>
+        </p:nvSpPr>
+        <p:spPr>
+          <a:xfrm rot="16200000">
+            <a:off x="5347614" y="790850"/>
+            <a:ext cx="196304" cy="378455"/>
+          </a:xfrm>
+          <a:prstGeom prst="leftBrace">
+            <a:avLst>
+              <a:gd name="adj1" fmla="val 8333"/>
+              <a:gd name="adj2" fmla="val 49003"/>
+            </a:avLst>
+          </a:prstGeom>
+          <a:ln w="19050">
+            <a:solidFill>
+              <a:schemeClr val="tx1"/>
+            </a:solidFill>
+          </a:ln>
+        </p:spPr>
+        <p:style>
+          <a:lnRef idx="1">
+            <a:schemeClr val="accent1"/>
+          </a:lnRef>
+          <a:fillRef idx="0">
+            <a:schemeClr val="accent1"/>
+          </a:fillRef>
+          <a:effectRef idx="0">
+            <a:schemeClr val="accent1"/>
+          </a:effectRef>
+          <a:fontRef idx="minor">
+            <a:schemeClr val="tx1"/>
+          </a:fontRef>
+        </p:style>
+        <p:txBody>
+          <a:bodyPr rtlCol="0" anchor="ctr"/>
+          <a:lstStyle/>
+          <a:p>
+            <a:pPr algn="ctr"/>
+            <a:endParaRPr lang="en-US"/>
+          </a:p>
+        </p:txBody>
+      </p:sp>
+      <p:sp>
+        <p:nvSpPr>
           <p:cNvPr id="9" name="TextBox 8"/>
           <p:cNvSpPr txBox="1"/>
           <p:nvPr/>
@@ -4765,7 +5895,7 @@
 </p:sld>
 </file>
 
-<file path=ppt/slides/slide4.xml><?xml version="1.0" encoding="utf-8"?>
+<file path=ppt/slides/slide5.xml><?xml version="1.0" encoding="utf-8"?>
 <p:sld xmlns:a="http://schemas.openxmlformats.org/drawingml/2006/main" xmlns:r="http://schemas.openxmlformats.org/officeDocument/2006/relationships" xmlns:p="http://schemas.openxmlformats.org/presentationml/2006/main">
   <p:cSld>
     <p:spTree>
@@ -5674,7 +6804,7 @@
 </p:sld>
 </file>
 
-<file path=ppt/slides/slide5.xml><?xml version="1.0" encoding="utf-8"?>
+<file path=ppt/slides/slide6.xml><?xml version="1.0" encoding="utf-8"?>
 <p:sld xmlns:a="http://schemas.openxmlformats.org/drawingml/2006/main" xmlns:r="http://schemas.openxmlformats.org/officeDocument/2006/relationships" xmlns:p="http://schemas.openxmlformats.org/presentationml/2006/main">
   <p:cSld>
     <p:spTree>
@@ -6542,6 +7672,119 @@
           </a:p>
         </p:txBody>
       </p:sp>
+      <mc:AlternateContent xmlns:mc="http://schemas.openxmlformats.org/markup-compatibility/2006">
+        <mc:Choice xmlns:a14="http://schemas.microsoft.com/office/drawing/2010/main" Requires="a14">
+          <p:sp>
+            <p:nvSpPr>
+              <p:cNvPr id="8" name="TextBox 7"/>
+              <p:cNvSpPr txBox="1"/>
+              <p:nvPr/>
+            </p:nvSpPr>
+            <p:spPr>
+              <a:xfrm>
+                <a:off x="5540775" y="4003631"/>
+                <a:ext cx="2175029" cy="646331"/>
+              </a:xfrm>
+              <a:prstGeom prst="rect">
+                <a:avLst/>
+              </a:prstGeom>
+              <a:noFill/>
+            </p:spPr>
+            <p:txBody>
+              <a:bodyPr wrap="square" rtlCol="0">
+                <a:spAutoFit/>
+              </a:bodyPr>
+              <a:lstStyle/>
+              <a:p>
+                <a:pPr algn="ctr"/>
+                <a:r>
+                  <a:rPr lang="en-US" dirty="0" smtClean="0">
+                    <a:solidFill>
+                      <a:srgbClr val="C00000"/>
+                    </a:solidFill>
+                  </a:rPr>
+                  <a:t>Error Band is </a:t>
+                </a:r>
+                <a14:m>
+                  <m:oMath xmlns:m="http://schemas.openxmlformats.org/officeDocument/2006/math">
+                    <m:r>
+                      <a:rPr lang="en-US" i="1" smtClean="0">
+                        <a:solidFill>
+                          <a:srgbClr val="C00000"/>
+                        </a:solidFill>
+                        <a:latin typeface="Cambria Math" panose="02040503050406030204" pitchFamily="18" charset="0"/>
+                        <a:ea typeface="Cambria Math" panose="02040503050406030204" pitchFamily="18" charset="0"/>
+                      </a:rPr>
+                      <m:t>±</m:t>
+                    </m:r>
+                    <m:r>
+                      <a:rPr lang="en-US" b="0" i="1" smtClean="0">
+                        <a:solidFill>
+                          <a:srgbClr val="C00000"/>
+                        </a:solidFill>
+                        <a:latin typeface="Cambria Math" panose="02040503050406030204" pitchFamily="18" charset="0"/>
+                        <a:ea typeface="Cambria Math" panose="02040503050406030204" pitchFamily="18" charset="0"/>
+                      </a:rPr>
+                      <m:t>1%</m:t>
+                    </m:r>
+                  </m:oMath>
+                </a14:m>
+                <a:r>
+                  <a:rPr lang="en-US" dirty="0" smtClean="0">
+                    <a:solidFill>
+                      <a:srgbClr val="C00000"/>
+                    </a:solidFill>
+                  </a:rPr>
+                  <a:t> of Sensor Range</a:t>
+                </a:r>
+                <a:endParaRPr lang="en-US" dirty="0">
+                  <a:solidFill>
+                    <a:srgbClr val="C00000"/>
+                  </a:solidFill>
+                </a:endParaRPr>
+              </a:p>
+            </p:txBody>
+          </p:sp>
+        </mc:Choice>
+        <mc:Fallback>
+          <p:sp>
+            <p:nvSpPr>
+              <p:cNvPr id="8" name="TextBox 7"/>
+              <p:cNvSpPr txBox="1">
+                <a:spLocks noRot="1" noChangeAspect="1" noMove="1" noResize="1" noEditPoints="1" noAdjustHandles="1" noChangeArrowheads="1" noChangeShapeType="1" noTextEdit="1"/>
+              </p:cNvSpPr>
+              <p:nvPr/>
+            </p:nvSpPr>
+            <p:spPr>
+              <a:xfrm>
+                <a:off x="5540775" y="4003631"/>
+                <a:ext cx="2175029" cy="646331"/>
+              </a:xfrm>
+              <a:prstGeom prst="rect">
+                <a:avLst/>
+              </a:prstGeom>
+              <a:blipFill rotWithShape="0">
+                <a:blip r:embed="rId5"/>
+                <a:stretch>
+                  <a:fillRect l="-2241" t="-5660" r="-4482" b="-14151"/>
+                </a:stretch>
+              </a:blipFill>
+            </p:spPr>
+            <p:txBody>
+              <a:bodyPr/>
+              <a:lstStyle/>
+              <a:p>
+                <a:r>
+                  <a:rPr lang="en-US">
+                    <a:noFill/>
+                  </a:rPr>
+                  <a:t> </a:t>
+                </a:r>
+              </a:p>
+            </p:txBody>
+          </p:sp>
+        </mc:Fallback>
+      </mc:AlternateContent>
     </p:spTree>
     <p:extLst>
       <p:ext uri="{BB962C8B-B14F-4D97-AF65-F5344CB8AC3E}">

</xml_diff>